<commit_message>
cambio leve detalle presentacion
</commit_message>
<xml_diff>
--- a/Documentacion/Presentacion.pptx
+++ b/Documentacion/Presentacion.pptx
@@ -456,7 +456,7 @@
             <a:fld id="{5923F103-BC34-4FE4-A40E-EDDEECFDA5D0}" type="datetimeFigureOut">
               <a:rPr lang="en-US" dirty="0"/>
               <a:pPr/>
-              <a:t>13-Jun-18</a:t>
+              <a:t>6/14/2018</a:t>
             </a:fld>
             <a:endParaRPr lang="en-US" dirty="0"/>
           </a:p>
@@ -1544,7 +1544,7 @@
           <a:p>
             <a:fld id="{923A1CC3-2375-41D4-9E03-427CAF2A4C1A}" type="datetimeFigureOut">
               <a:rPr lang="en-US" dirty="0"/>
-              <a:t>13-Jun-18</a:t>
+              <a:t>6/14/2018</a:t>
             </a:fld>
             <a:endParaRPr lang="en-US" dirty="0"/>
           </a:p>
@@ -2524,7 +2524,7 @@
           <a:p>
             <a:fld id="{AFF16868-8199-4C2C-A5B1-63AEE139F88E}" type="datetimeFigureOut">
               <a:rPr lang="en-US" dirty="0"/>
-              <a:t>13-Jun-18</a:t>
+              <a:t>6/14/2018</a:t>
             </a:fld>
             <a:endParaRPr lang="en-US" dirty="0"/>
           </a:p>
@@ -3658,7 +3658,7 @@
           <a:p>
             <a:fld id="{AAD9FF7F-6988-44CC-821B-644E70CD2F73}" type="datetimeFigureOut">
               <a:rPr lang="en-US" dirty="0"/>
-              <a:t>13-Jun-18</a:t>
+              <a:t>6/14/2018</a:t>
             </a:fld>
             <a:endParaRPr lang="en-US" dirty="0"/>
           </a:p>
@@ -4691,7 +4691,7 @@
           <a:p>
             <a:fld id="{5C12C299-16B2-4475-990D-751901EACC14}" type="datetimeFigureOut">
               <a:rPr lang="en-US" dirty="0"/>
-              <a:t>13-Jun-18</a:t>
+              <a:t>6/14/2018</a:t>
             </a:fld>
             <a:endParaRPr lang="en-US" dirty="0"/>
           </a:p>
@@ -5351,7 +5351,7 @@
           <a:p>
             <a:fld id="{9FE86839-B9D8-4651-8783-F325ECE74E65}" type="datetimeFigureOut">
               <a:rPr lang="en-US" dirty="0"/>
-              <a:t>13-Jun-18</a:t>
+              <a:t>6/14/2018</a:t>
             </a:fld>
             <a:endParaRPr lang="en-US" dirty="0"/>
           </a:p>
@@ -6212,7 +6212,7 @@
           <a:p>
             <a:fld id="{FD484F64-32F6-45C5-931F-ADC1662401D0}" type="datetimeFigureOut">
               <a:rPr lang="en-US" dirty="0"/>
-              <a:t>13-Jun-18</a:t>
+              <a:t>6/14/2018</a:t>
             </a:fld>
             <a:endParaRPr lang="en-US" dirty="0"/>
           </a:p>
@@ -6402,7 +6402,7 @@
           <a:p>
             <a:fld id="{53086D93-FCAC-47E0-A2EE-787E62CA814C}" type="datetimeFigureOut">
               <a:rPr lang="en-US" dirty="0"/>
-              <a:t>13-Jun-18</a:t>
+              <a:t>6/14/2018</a:t>
             </a:fld>
             <a:endParaRPr lang="en-US" dirty="0"/>
           </a:p>
@@ -7374,7 +7374,7 @@
           <a:p>
             <a:fld id="{CDA879A6-0FD0-4734-A311-86BFCA472E6E}" type="datetimeFigureOut">
               <a:rPr lang="en-US" dirty="0"/>
-              <a:t>13-Jun-18</a:t>
+              <a:t>6/14/2018</a:t>
             </a:fld>
             <a:endParaRPr lang="en-US" dirty="0"/>
           </a:p>
@@ -7585,7 +7585,7 @@
           <a:p>
             <a:fld id="{19C9CA7B-DFD4-44B5-8C60-D14B8CD1FB59}" type="datetimeFigureOut">
               <a:rPr lang="en-US" dirty="0"/>
-              <a:t>13-Jun-18</a:t>
+              <a:t>6/14/2018</a:t>
             </a:fld>
             <a:endParaRPr lang="en-US" dirty="0"/>
           </a:p>
@@ -8619,7 +8619,7 @@
           <a:p>
             <a:fld id="{F34E6425-0181-43F2-84FC-787E803FD2F8}" type="datetimeFigureOut">
               <a:rPr lang="en-US" dirty="0"/>
-              <a:t>13-Jun-18</a:t>
+              <a:t>6/14/2018</a:t>
             </a:fld>
             <a:endParaRPr lang="en-US" dirty="0"/>
           </a:p>
@@ -8891,7 +8891,7 @@
           <a:p>
             <a:fld id="{3BDB8791-F1B0-41E7-B7FD-A781E65C4266}" type="datetimeFigureOut">
               <a:rPr lang="en-US" dirty="0"/>
-              <a:t>13-Jun-18</a:t>
+              <a:t>6/14/2018</a:t>
             </a:fld>
             <a:endParaRPr lang="en-US" dirty="0"/>
           </a:p>
@@ -9301,7 +9301,7 @@
           <a:p>
             <a:fld id="{5FDD63B2-E120-4ED8-B27B-C685F510A5FE}" type="datetimeFigureOut">
               <a:rPr lang="en-US" dirty="0"/>
-              <a:t>13-Jun-18</a:t>
+              <a:t>6/14/2018</a:t>
             </a:fld>
             <a:endParaRPr lang="en-US" dirty="0"/>
           </a:p>
@@ -9428,7 +9428,7 @@
           <a:p>
             <a:fld id="{7AA18ACC-A947-437B-A130-35BD54FDF1E9}" type="datetimeFigureOut">
               <a:rPr lang="en-US" dirty="0"/>
-              <a:t>13-Jun-18</a:t>
+              <a:t>6/14/2018</a:t>
             </a:fld>
             <a:endParaRPr lang="en-US" dirty="0"/>
           </a:p>
@@ -9523,7 +9523,7 @@
           <a:p>
             <a:fld id="{7C8D7E02-BCB8-4D50-A234-369438C08659}" type="datetimeFigureOut">
               <a:rPr lang="en-US" dirty="0"/>
-              <a:t>13-Jun-18</a:t>
+              <a:t>6/14/2018</a:t>
             </a:fld>
             <a:endParaRPr lang="en-US" dirty="0"/>
           </a:p>
@@ -10604,7 +10604,7 @@
           <a:p>
             <a:fld id="{76E86A4C-8E40-4F87-A4F0-01A0687C5742}" type="datetimeFigureOut">
               <a:rPr lang="en-US" dirty="0"/>
-              <a:t>13-Jun-18</a:t>
+              <a:t>6/14/2018</a:t>
             </a:fld>
             <a:endParaRPr lang="en-US" dirty="0"/>
           </a:p>
@@ -11712,7 +11712,7 @@
           <a:p>
             <a:fld id="{35E72C73-2D91-4E12-BA25-F0AA0C03599B}" type="datetimeFigureOut">
               <a:rPr lang="en-US" dirty="0"/>
-              <a:t>13-Jun-18</a:t>
+              <a:t>6/14/2018</a:t>
             </a:fld>
             <a:endParaRPr lang="en-US" dirty="0"/>
           </a:p>
@@ -12709,7 +12709,7 @@
           <a:p>
             <a:fld id="{2BE451C3-0FF4-47C4-B829-773ADF60F88C}" type="datetimeFigureOut">
               <a:rPr lang="en-US" dirty="0"/>
-              <a:t>13-Jun-18</a:t>
+              <a:t>6/14/2018</a:t>
             </a:fld>
             <a:endParaRPr lang="en-US" dirty="0"/>
           </a:p>
@@ -17448,10 +17448,10 @@
       </p:sp>
       <p:pic>
         <p:nvPicPr>
-          <p:cNvPr id="4" name="Picture 3">
+          <p:cNvPr id="6" name="Picture 5">
             <a:extLst>
               <a:ext uri="{FF2B5EF4-FFF2-40B4-BE49-F238E27FC236}">
-                <a16:creationId xmlns:a16="http://schemas.microsoft.com/office/drawing/2014/main" id="{F8BE3513-5A47-4D14-8F3B-CB810E3069F5}"/>
+                <a16:creationId xmlns:a16="http://schemas.microsoft.com/office/drawing/2014/main" id="{B21287E9-2A98-45DB-9FBF-6B53E7AE581F}"/>
               </a:ext>
             </a:extLst>
           </p:cNvPr>
@@ -17468,19 +17468,19 @@
         </p:blipFill>
         <p:spPr>
           <a:xfrm>
-            <a:off x="4984956" y="2777530"/>
-            <a:ext cx="6158802" cy="3064004"/>
+            <a:off x="4346086" y="2565410"/>
+            <a:ext cx="7544356" cy="3318922"/>
           </a:xfrm>
           <a:prstGeom prst="roundRect">
             <a:avLst>
-              <a:gd name="adj" fmla="val 1858"/>
+              <a:gd name="adj" fmla="val 1567"/>
             </a:avLst>
           </a:prstGeom>
           <a:effectLst>
-            <a:outerShdw blurRad="50800" dist="50800" dir="5400000" algn="tl" rotWithShape="0">
-              <a:srgbClr val="000000">
-                <a:alpha val="43000"/>
-              </a:srgbClr>
+            <a:outerShdw blurRad="50800" dist="38100" dir="2700000" algn="tl" rotWithShape="0">
+              <a:prstClr val="black">
+                <a:alpha val="40000"/>
+              </a:prstClr>
             </a:outerShdw>
           </a:effectLst>
         </p:spPr>

</xml_diff>